<commit_message>
Added slides to Presentations\firstPresentation powerpoint
</commit_message>
<xml_diff>
--- a/Presentations/firstPresentation.pptx
+++ b/Presentations/firstPresentation.pptx
@@ -15,7 +15,9 @@
     <p:sldId id="262" r:id="rId9"/>
     <p:sldId id="263" r:id="rId10"/>
     <p:sldId id="265" r:id="rId11"/>
-    <p:sldId id="264" r:id="rId12"/>
+    <p:sldId id="268" r:id="rId12"/>
+    <p:sldId id="267" r:id="rId13"/>
+    <p:sldId id="264" r:id="rId14"/>
   </p:sldIdLst>
   <p:sldSz cx="9144000" cy="6858000" type="screen4x3"/>
   <p:notesSz cx="6858000" cy="9144000"/>
@@ -569,7 +571,7 @@
             </a:ln>
             <a:extLst>
               <a:ext uri="{91240B29-F687-4f45-9708-019B960494DF}">
-                <a14:hiddenLine xmlns="" xmlns:a14="http://schemas.microsoft.com/office/drawing/2010/main" w="9525">
+                <a14:hiddenLine xmlns:a14="http://schemas.microsoft.com/office/drawing/2010/main" xmlns="" w="9525">
                   <a:solidFill>
                     <a:srgbClr val="000000"/>
                   </a:solidFill>
@@ -766,7 +768,7 @@
           <a:p>
             <a:fld id="{4B4B45D1-93A5-4A59-A5EE-B733116B9EF3}" type="datetimeFigureOut">
               <a:rPr lang="en-GB" smtClean="0"/>
-              <a:t>13/10/2016</a:t>
+              <a:t>16/10/2016</a:t>
             </a:fld>
             <a:endParaRPr lang="en-GB"/>
           </a:p>
@@ -1650,7 +1652,7 @@
             </a:ln>
             <a:extLst>
               <a:ext uri="{91240B29-F687-4f45-9708-019B960494DF}">
-                <a14:hiddenLine xmlns="" xmlns:a14="http://schemas.microsoft.com/office/drawing/2010/main" w="9525">
+                <a14:hiddenLine xmlns:a14="http://schemas.microsoft.com/office/drawing/2010/main" xmlns="" w="9525">
                   <a:solidFill>
                     <a:srgbClr val="000000"/>
                   </a:solidFill>
@@ -1867,7 +1869,7 @@
           <a:p>
             <a:fld id="{4B4B45D1-93A5-4A59-A5EE-B733116B9EF3}" type="datetimeFigureOut">
               <a:rPr lang="en-GB" smtClean="0"/>
-              <a:t>13/10/2016</a:t>
+              <a:t>16/10/2016</a:t>
             </a:fld>
             <a:endParaRPr lang="en-GB"/>
           </a:p>
@@ -2736,7 +2738,7 @@
             </a:ln>
             <a:extLst>
               <a:ext uri="{91240B29-F687-4f45-9708-019B960494DF}">
-                <a14:hiddenLine xmlns="" xmlns:a14="http://schemas.microsoft.com/office/drawing/2010/main" w="9525">
+                <a14:hiddenLine xmlns:a14="http://schemas.microsoft.com/office/drawing/2010/main" xmlns="" w="9525">
                   <a:solidFill>
                     <a:srgbClr val="000000"/>
                   </a:solidFill>
@@ -2865,7 +2867,7 @@
           <a:p>
             <a:fld id="{4B4B45D1-93A5-4A59-A5EE-B733116B9EF3}" type="datetimeFigureOut">
               <a:rPr lang="en-GB" smtClean="0"/>
-              <a:t>13/10/2016</a:t>
+              <a:t>16/10/2016</a:t>
             </a:fld>
             <a:endParaRPr lang="en-GB"/>
           </a:p>
@@ -3697,7 +3699,7 @@
             </a:ln>
             <a:extLst>
               <a:ext uri="{91240B29-F687-4f45-9708-019B960494DF}">
-                <a14:hiddenLine xmlns="" xmlns:a14="http://schemas.microsoft.com/office/drawing/2010/main" w="9525">
+                <a14:hiddenLine xmlns:a14="http://schemas.microsoft.com/office/drawing/2010/main" xmlns="" w="9525">
                   <a:solidFill>
                     <a:srgbClr val="000000"/>
                   </a:solidFill>
@@ -3980,7 +3982,7 @@
           <a:p>
             <a:fld id="{4B4B45D1-93A5-4A59-A5EE-B733116B9EF3}" type="datetimeFigureOut">
               <a:rPr lang="en-GB" smtClean="0"/>
-              <a:t>13/10/2016</a:t>
+              <a:t>16/10/2016</a:t>
             </a:fld>
             <a:endParaRPr lang="en-GB"/>
           </a:p>
@@ -4812,7 +4814,7 @@
             </a:ln>
             <a:extLst>
               <a:ext uri="{91240B29-F687-4f45-9708-019B960494DF}">
-                <a14:hiddenLine xmlns="" xmlns:a14="http://schemas.microsoft.com/office/drawing/2010/main" w="9525">
+                <a14:hiddenLine xmlns:a14="http://schemas.microsoft.com/office/drawing/2010/main" xmlns="" w="9525">
                   <a:solidFill>
                     <a:srgbClr val="000000"/>
                   </a:solidFill>
@@ -4994,7 +4996,7 @@
           <a:p>
             <a:fld id="{4B4B45D1-93A5-4A59-A5EE-B733116B9EF3}" type="datetimeFigureOut">
               <a:rPr lang="en-GB" smtClean="0"/>
-              <a:t>13/10/2016</a:t>
+              <a:t>16/10/2016</a:t>
             </a:fld>
             <a:endParaRPr lang="en-GB"/>
           </a:p>
@@ -5666,7 +5668,7 @@
           <a:p>
             <a:fld id="{4B4B45D1-93A5-4A59-A5EE-B733116B9EF3}" type="datetimeFigureOut">
               <a:rPr lang="en-GB" smtClean="0"/>
-              <a:t>13/10/2016</a:t>
+              <a:t>16/10/2016</a:t>
             </a:fld>
             <a:endParaRPr lang="en-GB"/>
           </a:p>
@@ -6539,7 +6541,7 @@
           <a:p>
             <a:fld id="{4B4B45D1-93A5-4A59-A5EE-B733116B9EF3}" type="datetimeFigureOut">
               <a:rPr lang="en-GB" smtClean="0"/>
-              <a:t>13/10/2016</a:t>
+              <a:t>16/10/2016</a:t>
             </a:fld>
             <a:endParaRPr lang="en-GB"/>
           </a:p>
@@ -6726,7 +6728,7 @@
           <a:p>
             <a:fld id="{4B4B45D1-93A5-4A59-A5EE-B733116B9EF3}" type="datetimeFigureOut">
               <a:rPr lang="en-GB" smtClean="0"/>
-              <a:t>13/10/2016</a:t>
+              <a:t>16/10/2016</a:t>
             </a:fld>
             <a:endParaRPr lang="en-GB"/>
           </a:p>
@@ -7561,7 +7563,7 @@
           </a:ln>
           <a:extLst>
             <a:ext uri="{91240B29-F687-4f45-9708-019B960494DF}">
-              <a14:hiddenLine xmlns="" xmlns:a14="http://schemas.microsoft.com/office/drawing/2010/main" w="9525">
+              <a14:hiddenLine xmlns:a14="http://schemas.microsoft.com/office/drawing/2010/main" xmlns="" w="9525">
                 <a:solidFill>
                   <a:srgbClr val="000000"/>
                 </a:solidFill>
@@ -7675,7 +7677,7 @@
           <a:p>
             <a:fld id="{4B4B45D1-93A5-4A59-A5EE-B733116B9EF3}" type="datetimeFigureOut">
               <a:rPr lang="en-GB" smtClean="0"/>
-              <a:t>13/10/2016</a:t>
+              <a:t>16/10/2016</a:t>
             </a:fld>
             <a:endParaRPr lang="en-GB"/>
           </a:p>
@@ -7907,7 +7909,7 @@
           <a:p>
             <a:fld id="{4B4B45D1-93A5-4A59-A5EE-B733116B9EF3}" type="datetimeFigureOut">
               <a:rPr lang="en-GB" smtClean="0"/>
-              <a:t>13/10/2016</a:t>
+              <a:t>16/10/2016</a:t>
             </a:fld>
             <a:endParaRPr lang="en-GB"/>
           </a:p>
@@ -8736,7 +8738,7 @@
             </a:ln>
             <a:extLst>
               <a:ext uri="{91240B29-F687-4f45-9708-019B960494DF}">
-                <a14:hiddenLine xmlns="" xmlns:a14="http://schemas.microsoft.com/office/drawing/2010/main" w="9525">
+                <a14:hiddenLine xmlns:a14="http://schemas.microsoft.com/office/drawing/2010/main" xmlns="" w="9525">
                   <a:solidFill>
                     <a:srgbClr val="000000"/>
                   </a:solidFill>
@@ -8918,7 +8920,7 @@
           <a:p>
             <a:fld id="{4B4B45D1-93A5-4A59-A5EE-B733116B9EF3}" type="datetimeFigureOut">
               <a:rPr lang="en-GB" smtClean="0"/>
-              <a:t>13/10/2016</a:t>
+              <a:t>16/10/2016</a:t>
             </a:fld>
             <a:endParaRPr lang="en-GB"/>
           </a:p>
@@ -9202,7 +9204,7 @@
           <a:p>
             <a:fld id="{4B4B45D1-93A5-4A59-A5EE-B733116B9EF3}" type="datetimeFigureOut">
               <a:rPr lang="en-GB" smtClean="0"/>
-              <a:t>13/10/2016</a:t>
+              <a:t>16/10/2016</a:t>
             </a:fld>
             <a:endParaRPr lang="en-GB"/>
           </a:p>
@@ -9602,7 +9604,7 @@
           <a:p>
             <a:fld id="{4B4B45D1-93A5-4A59-A5EE-B733116B9EF3}" type="datetimeFigureOut">
               <a:rPr lang="en-GB" smtClean="0"/>
-              <a:t>13/10/2016</a:t>
+              <a:t>16/10/2016</a:t>
             </a:fld>
             <a:endParaRPr lang="en-GB"/>
           </a:p>
@@ -9732,7 +9734,7 @@
           <a:p>
             <a:fld id="{4B4B45D1-93A5-4A59-A5EE-B733116B9EF3}" type="datetimeFigureOut">
               <a:rPr lang="en-GB" smtClean="0"/>
-              <a:t>13/10/2016</a:t>
+              <a:t>16/10/2016</a:t>
             </a:fld>
             <a:endParaRPr lang="en-GB"/>
           </a:p>
@@ -9875,7 +9877,7 @@
           <a:p>
             <a:fld id="{4B4B45D1-93A5-4A59-A5EE-B733116B9EF3}" type="datetimeFigureOut">
               <a:rPr lang="en-GB" smtClean="0"/>
-              <a:t>13/10/2016</a:t>
+              <a:t>16/10/2016</a:t>
             </a:fld>
             <a:endParaRPr lang="en-GB"/>
           </a:p>
@@ -10704,7 +10706,7 @@
             </a:ln>
             <a:extLst>
               <a:ext uri="{91240B29-F687-4f45-9708-019B960494DF}">
-                <a14:hiddenLine xmlns="" xmlns:a14="http://schemas.microsoft.com/office/drawing/2010/main" w="9525">
+                <a14:hiddenLine xmlns:a14="http://schemas.microsoft.com/office/drawing/2010/main" xmlns="" w="9525">
                   <a:solidFill>
                     <a:srgbClr val="000000"/>
                   </a:solidFill>
@@ -10897,7 +10899,7 @@
           <a:p>
             <a:fld id="{4B4B45D1-93A5-4A59-A5EE-B733116B9EF3}" type="datetimeFigureOut">
               <a:rPr lang="en-GB" smtClean="0"/>
-              <a:t>13/10/2016</a:t>
+              <a:t>16/10/2016</a:t>
             </a:fld>
             <a:endParaRPr lang="en-GB"/>
           </a:p>
@@ -11762,7 +11764,7 @@
             </a:ln>
             <a:extLst>
               <a:ext uri="{91240B29-F687-4f45-9708-019B960494DF}">
-                <a14:hiddenLine xmlns="" xmlns:a14="http://schemas.microsoft.com/office/drawing/2010/main" w="9525">
+                <a14:hiddenLine xmlns:a14="http://schemas.microsoft.com/office/drawing/2010/main" xmlns="" w="9525">
                   <a:solidFill>
                     <a:srgbClr val="000000"/>
                   </a:solidFill>
@@ -11979,7 +11981,7 @@
           <a:p>
             <a:fld id="{4B4B45D1-93A5-4A59-A5EE-B733116B9EF3}" type="datetimeFigureOut">
               <a:rPr lang="en-GB" smtClean="0"/>
-              <a:t>13/10/2016</a:t>
+              <a:t>16/10/2016</a:t>
             </a:fld>
             <a:endParaRPr lang="en-GB"/>
           </a:p>
@@ -12812,7 +12814,7 @@
             </a:ln>
             <a:extLst>
               <a:ext uri="{91240B29-F687-4f45-9708-019B960494DF}">
-                <a14:hiddenLine xmlns="" xmlns:a14="http://schemas.microsoft.com/office/drawing/2010/main" w="9525">
+                <a14:hiddenLine xmlns:a14="http://schemas.microsoft.com/office/drawing/2010/main" xmlns="" w="9525">
                   <a:solidFill>
                     <a:srgbClr val="000000"/>
                   </a:solidFill>
@@ -12953,7 +12955,7 @@
           <a:p>
             <a:fld id="{4B4B45D1-93A5-4A59-A5EE-B733116B9EF3}" type="datetimeFigureOut">
               <a:rPr lang="en-GB" smtClean="0"/>
-              <a:t>13/10/2016</a:t>
+              <a:t>16/10/2016</a:t>
             </a:fld>
             <a:endParaRPr lang="en-GB"/>
           </a:p>
@@ -13606,35 +13608,9 @@
           <a:p>
             <a:r>
               <a:rPr lang="en-GB" dirty="0" smtClean="0"/>
-              <a:t>Moodboards and Artstyle</a:t>
+              <a:t>Mood boards</a:t>
             </a:r>
             <a:endParaRPr lang="en-GB" dirty="0"/>
-          </a:p>
-        </p:txBody>
-      </p:sp>
-      <p:sp>
-        <p:nvSpPr>
-          <p:cNvPr id="3" name="Content Placeholder 2"/>
-          <p:cNvSpPr>
-            <a:spLocks noGrp="1"/>
-          </p:cNvSpPr>
-          <p:nvPr>
-            <p:ph idx="1"/>
-          </p:nvPr>
-        </p:nvSpPr>
-        <p:spPr>
-          <a:xfrm>
-            <a:off x="533400" y="2438400"/>
-            <a:ext cx="6345260" cy="3530600"/>
-          </a:xfrm>
-        </p:spPr>
-        <p:txBody>
-          <a:bodyPr>
-            <a:normAutofit/>
-          </a:bodyPr>
-          <a:lstStyle/>
-          <a:p>
-            <a:endParaRPr lang="en-GB" sz="2200" dirty="0"/>
           </a:p>
         </p:txBody>
       </p:sp>
@@ -13668,6 +13644,126 @@
           </a:p>
         </p:txBody>
       </p:sp>
+      <p:pic>
+        <p:nvPicPr>
+          <p:cNvPr id="5" name="Picture 4"/>
+          <p:cNvPicPr>
+            <a:picLocks noChangeAspect="1"/>
+          </p:cNvPicPr>
+          <p:nvPr/>
+        </p:nvPicPr>
+        <p:blipFill>
+          <a:blip r:embed="rId2" cstate="print">
+            <a:extLst>
+              <a:ext uri="{28A0092B-C50C-407E-A947-70E740481C1C}">
+                <a14:useLocalDpi xmlns:a14="http://schemas.microsoft.com/office/drawing/2010/main" val="0"/>
+              </a:ext>
+            </a:extLst>
+          </a:blip>
+          <a:stretch>
+            <a:fillRect/>
+          </a:stretch>
+        </p:blipFill>
+        <p:spPr>
+          <a:xfrm>
+            <a:off x="558800" y="4591467"/>
+            <a:ext cx="3733802" cy="2211220"/>
+          </a:xfrm>
+          <a:prstGeom prst="rect">
+            <a:avLst/>
+          </a:prstGeom>
+        </p:spPr>
+      </p:pic>
+      <p:pic>
+        <p:nvPicPr>
+          <p:cNvPr id="6" name="Picture 5"/>
+          <p:cNvPicPr>
+            <a:picLocks noChangeAspect="1"/>
+          </p:cNvPicPr>
+          <p:nvPr/>
+        </p:nvPicPr>
+        <p:blipFill>
+          <a:blip r:embed="rId3" cstate="print">
+            <a:extLst>
+              <a:ext uri="{28A0092B-C50C-407E-A947-70E740481C1C}">
+                <a14:useLocalDpi xmlns:a14="http://schemas.microsoft.com/office/drawing/2010/main" val="0"/>
+              </a:ext>
+            </a:extLst>
+          </a:blip>
+          <a:stretch>
+            <a:fillRect/>
+          </a:stretch>
+        </p:blipFill>
+        <p:spPr>
+          <a:xfrm>
+            <a:off x="558801" y="2023158"/>
+            <a:ext cx="3733801" cy="2412732"/>
+          </a:xfrm>
+          <a:prstGeom prst="rect">
+            <a:avLst/>
+          </a:prstGeom>
+        </p:spPr>
+      </p:pic>
+      <p:pic>
+        <p:nvPicPr>
+          <p:cNvPr id="7" name="Picture 6"/>
+          <p:cNvPicPr>
+            <a:picLocks noChangeAspect="1"/>
+          </p:cNvPicPr>
+          <p:nvPr/>
+        </p:nvPicPr>
+        <p:blipFill>
+          <a:blip r:embed="rId4" cstate="print">
+            <a:extLst>
+              <a:ext uri="{28A0092B-C50C-407E-A947-70E740481C1C}">
+                <a14:useLocalDpi xmlns:a14="http://schemas.microsoft.com/office/drawing/2010/main" val="0"/>
+              </a:ext>
+            </a:extLst>
+          </a:blip>
+          <a:stretch>
+            <a:fillRect/>
+          </a:stretch>
+        </p:blipFill>
+        <p:spPr>
+          <a:xfrm>
+            <a:off x="5080430" y="2023158"/>
+            <a:ext cx="3860371" cy="2412732"/>
+          </a:xfrm>
+          <a:prstGeom prst="rect">
+            <a:avLst/>
+          </a:prstGeom>
+        </p:spPr>
+      </p:pic>
+      <p:pic>
+        <p:nvPicPr>
+          <p:cNvPr id="8" name="Picture 7"/>
+          <p:cNvPicPr>
+            <a:picLocks noChangeAspect="1"/>
+          </p:cNvPicPr>
+          <p:nvPr/>
+        </p:nvPicPr>
+        <p:blipFill>
+          <a:blip r:embed="rId5" cstate="print">
+            <a:extLst>
+              <a:ext uri="{28A0092B-C50C-407E-A947-70E740481C1C}">
+                <a14:useLocalDpi xmlns:a14="http://schemas.microsoft.com/office/drawing/2010/main" val="0"/>
+              </a:ext>
+            </a:extLst>
+          </a:blip>
+          <a:stretch>
+            <a:fillRect/>
+          </a:stretch>
+        </p:blipFill>
+        <p:spPr>
+          <a:xfrm>
+            <a:off x="5080430" y="4577171"/>
+            <a:ext cx="3860371" cy="2225516"/>
+          </a:xfrm>
+          <a:prstGeom prst="rect">
+            <a:avLst/>
+          </a:prstGeom>
+        </p:spPr>
+      </p:pic>
     </p:spTree>
   </p:cSld>
   <p:clrMapOvr>
@@ -13677,6 +13773,412 @@
 </file>
 
 <file path=ppt/slides/slide11.xml><?xml version="1.0" encoding="utf-8"?>
+<p:sld xmlns:a="http://schemas.openxmlformats.org/drawingml/2006/main" xmlns:r="http://schemas.openxmlformats.org/officeDocument/2006/relationships" xmlns:p="http://schemas.openxmlformats.org/presentationml/2006/main">
+  <p:cSld>
+    <p:spTree>
+      <p:nvGrpSpPr>
+        <p:cNvPr id="1" name=""/>
+        <p:cNvGrpSpPr/>
+        <p:nvPr/>
+      </p:nvGrpSpPr>
+      <p:grpSpPr>
+        <a:xfrm>
+          <a:off x="0" y="0"/>
+          <a:ext cx="0" cy="0"/>
+          <a:chOff x="0" y="0"/>
+          <a:chExt cx="0" cy="0"/>
+        </a:xfrm>
+      </p:grpSpPr>
+      <p:sp>
+        <p:nvSpPr>
+          <p:cNvPr id="2" name="Title 1"/>
+          <p:cNvSpPr>
+            <a:spLocks noGrp="1"/>
+          </p:cNvSpPr>
+          <p:nvPr>
+            <p:ph type="title"/>
+          </p:nvPr>
+        </p:nvSpPr>
+        <p:spPr/>
+        <p:txBody>
+          <a:bodyPr/>
+          <a:lstStyle/>
+          <a:p>
+            <a:r>
+              <a:rPr lang="en-GB" dirty="0" smtClean="0"/>
+              <a:t>Mood boards</a:t>
+            </a:r>
+            <a:endParaRPr lang="en-GB" dirty="0"/>
+          </a:p>
+        </p:txBody>
+      </p:sp>
+      <p:sp>
+        <p:nvSpPr>
+          <p:cNvPr id="4" name="TextBox 3"/>
+          <p:cNvSpPr txBox="1"/>
+          <p:nvPr/>
+        </p:nvSpPr>
+        <p:spPr>
+          <a:xfrm>
+            <a:off x="0" y="6477000"/>
+            <a:ext cx="533400" cy="381000"/>
+          </a:xfrm>
+          <a:prstGeom prst="rect">
+            <a:avLst/>
+          </a:prstGeom>
+          <a:noFill/>
+        </p:spPr>
+        <p:txBody>
+          <a:bodyPr wrap="square" rtlCol="0">
+            <a:spAutoFit/>
+          </a:bodyPr>
+          <a:lstStyle/>
+          <a:p>
+            <a:r>
+              <a:rPr lang="en-GB" dirty="0" smtClean="0"/>
+              <a:t>HS</a:t>
+            </a:r>
+            <a:endParaRPr lang="en-GB" dirty="0"/>
+          </a:p>
+        </p:txBody>
+      </p:sp>
+      <p:pic>
+        <p:nvPicPr>
+          <p:cNvPr id="5" name="Picture 4"/>
+          <p:cNvPicPr>
+            <a:picLocks noChangeAspect="1"/>
+          </p:cNvPicPr>
+          <p:nvPr/>
+        </p:nvPicPr>
+        <p:blipFill>
+          <a:blip r:embed="rId2">
+            <a:extLst>
+              <a:ext uri="{28A0092B-C50C-407E-A947-70E740481C1C}">
+                <a14:useLocalDpi xmlns:a14="http://schemas.microsoft.com/office/drawing/2010/main" val="0"/>
+              </a:ext>
+            </a:extLst>
+          </a:blip>
+          <a:stretch>
+            <a:fillRect/>
+          </a:stretch>
+        </p:blipFill>
+        <p:spPr>
+          <a:xfrm>
+            <a:off x="520700" y="2207911"/>
+            <a:ext cx="4838486" cy="2003604"/>
+          </a:xfrm>
+          <a:prstGeom prst="rect">
+            <a:avLst/>
+          </a:prstGeom>
+        </p:spPr>
+      </p:pic>
+      <p:pic>
+        <p:nvPicPr>
+          <p:cNvPr id="6" name="Picture 5"/>
+          <p:cNvPicPr>
+            <a:picLocks noChangeAspect="1"/>
+          </p:cNvPicPr>
+          <p:nvPr/>
+        </p:nvPicPr>
+        <p:blipFill>
+          <a:blip r:embed="rId3" cstate="print">
+            <a:extLst>
+              <a:ext uri="{28A0092B-C50C-407E-A947-70E740481C1C}">
+                <a14:useLocalDpi xmlns:a14="http://schemas.microsoft.com/office/drawing/2010/main" val="0"/>
+              </a:ext>
+            </a:extLst>
+          </a:blip>
+          <a:stretch>
+            <a:fillRect/>
+          </a:stretch>
+        </p:blipFill>
+        <p:spPr>
+          <a:xfrm>
+            <a:off x="4707393" y="2195211"/>
+            <a:ext cx="4136473" cy="2003604"/>
+          </a:xfrm>
+          <a:prstGeom prst="rect">
+            <a:avLst/>
+          </a:prstGeom>
+        </p:spPr>
+      </p:pic>
+      <p:pic>
+        <p:nvPicPr>
+          <p:cNvPr id="7" name="Picture 6"/>
+          <p:cNvPicPr>
+            <a:picLocks noChangeAspect="1"/>
+          </p:cNvPicPr>
+          <p:nvPr/>
+        </p:nvPicPr>
+        <p:blipFill>
+          <a:blip r:embed="rId4" cstate="print">
+            <a:extLst>
+              <a:ext uri="{28A0092B-C50C-407E-A947-70E740481C1C}">
+                <a14:useLocalDpi xmlns:a14="http://schemas.microsoft.com/office/drawing/2010/main" val="0"/>
+              </a:ext>
+            </a:extLst>
+          </a:blip>
+          <a:stretch>
+            <a:fillRect/>
+          </a:stretch>
+        </p:blipFill>
+        <p:spPr>
+          <a:xfrm>
+            <a:off x="520700" y="4200704"/>
+            <a:ext cx="4586292" cy="2414077"/>
+          </a:xfrm>
+          <a:prstGeom prst="rect">
+            <a:avLst/>
+          </a:prstGeom>
+        </p:spPr>
+      </p:pic>
+      <p:pic>
+        <p:nvPicPr>
+          <p:cNvPr id="8" name="Picture 7"/>
+          <p:cNvPicPr>
+            <a:picLocks noChangeAspect="1"/>
+          </p:cNvPicPr>
+          <p:nvPr/>
+        </p:nvPicPr>
+        <p:blipFill>
+          <a:blip r:embed="rId5" cstate="print">
+            <a:extLst>
+              <a:ext uri="{28A0092B-C50C-407E-A947-70E740481C1C}">
+                <a14:useLocalDpi xmlns:a14="http://schemas.microsoft.com/office/drawing/2010/main" val="0"/>
+              </a:ext>
+            </a:extLst>
+          </a:blip>
+          <a:stretch>
+            <a:fillRect/>
+          </a:stretch>
+        </p:blipFill>
+        <p:spPr>
+          <a:xfrm>
+            <a:off x="4707393" y="4189729"/>
+            <a:ext cx="4136473" cy="2423715"/>
+          </a:xfrm>
+          <a:prstGeom prst="rect">
+            <a:avLst/>
+          </a:prstGeom>
+        </p:spPr>
+      </p:pic>
+    </p:spTree>
+    <p:extLst>
+      <p:ext uri="{BB962C8B-B14F-4D97-AF65-F5344CB8AC3E}">
+        <p14:creationId xmlns:p14="http://schemas.microsoft.com/office/powerpoint/2010/main" val="91307846"/>
+      </p:ext>
+    </p:extLst>
+  </p:cSld>
+  <p:clrMapOvr>
+    <a:masterClrMapping/>
+  </p:clrMapOvr>
+</p:sld>
+</file>
+
+<file path=ppt/slides/slide12.xml><?xml version="1.0" encoding="utf-8"?>
+<p:sld xmlns:a="http://schemas.openxmlformats.org/drawingml/2006/main" xmlns:r="http://schemas.openxmlformats.org/officeDocument/2006/relationships" xmlns:p="http://schemas.openxmlformats.org/presentationml/2006/main">
+  <p:cSld>
+    <p:spTree>
+      <p:nvGrpSpPr>
+        <p:cNvPr id="1" name=""/>
+        <p:cNvGrpSpPr/>
+        <p:nvPr/>
+      </p:nvGrpSpPr>
+      <p:grpSpPr>
+        <a:xfrm>
+          <a:off x="0" y="0"/>
+          <a:ext cx="0" cy="0"/>
+          <a:chOff x="0" y="0"/>
+          <a:chExt cx="0" cy="0"/>
+        </a:xfrm>
+      </p:grpSpPr>
+      <p:sp>
+        <p:nvSpPr>
+          <p:cNvPr id="2" name="Title 1"/>
+          <p:cNvSpPr>
+            <a:spLocks noGrp="1"/>
+          </p:cNvSpPr>
+          <p:nvPr>
+            <p:ph type="title"/>
+          </p:nvPr>
+        </p:nvSpPr>
+        <p:spPr/>
+        <p:txBody>
+          <a:bodyPr/>
+          <a:lstStyle/>
+          <a:p>
+            <a:r>
+              <a:rPr lang="en-GB" dirty="0" smtClean="0"/>
+              <a:t>Art style</a:t>
+            </a:r>
+            <a:endParaRPr lang="en-GB" dirty="0"/>
+          </a:p>
+        </p:txBody>
+      </p:sp>
+      <p:sp>
+        <p:nvSpPr>
+          <p:cNvPr id="4" name="TextBox 3"/>
+          <p:cNvSpPr txBox="1"/>
+          <p:nvPr/>
+        </p:nvSpPr>
+        <p:spPr>
+          <a:xfrm>
+            <a:off x="0" y="6477000"/>
+            <a:ext cx="533400" cy="381000"/>
+          </a:xfrm>
+          <a:prstGeom prst="rect">
+            <a:avLst/>
+          </a:prstGeom>
+          <a:noFill/>
+        </p:spPr>
+        <p:txBody>
+          <a:bodyPr wrap="square" rtlCol="0">
+            <a:spAutoFit/>
+          </a:bodyPr>
+          <a:lstStyle/>
+          <a:p>
+            <a:r>
+              <a:rPr lang="en-GB" dirty="0" smtClean="0"/>
+              <a:t>HS</a:t>
+            </a:r>
+            <a:endParaRPr lang="en-GB" dirty="0"/>
+          </a:p>
+        </p:txBody>
+      </p:sp>
+      <p:pic>
+        <p:nvPicPr>
+          <p:cNvPr id="5" name="Picture 4"/>
+          <p:cNvPicPr>
+            <a:picLocks noChangeAspect="1"/>
+          </p:cNvPicPr>
+          <p:nvPr/>
+        </p:nvPicPr>
+        <p:blipFill>
+          <a:blip r:embed="rId2" cstate="print">
+            <a:extLst>
+              <a:ext uri="{28A0092B-C50C-407E-A947-70E740481C1C}">
+                <a14:useLocalDpi xmlns:a14="http://schemas.microsoft.com/office/drawing/2010/main" val="0"/>
+              </a:ext>
+            </a:extLst>
+          </a:blip>
+          <a:stretch>
+            <a:fillRect/>
+          </a:stretch>
+        </p:blipFill>
+        <p:spPr>
+          <a:xfrm>
+            <a:off x="4876800" y="1636963"/>
+            <a:ext cx="3644900" cy="2438480"/>
+          </a:xfrm>
+          <a:prstGeom prst="rect">
+            <a:avLst/>
+          </a:prstGeom>
+        </p:spPr>
+      </p:pic>
+      <p:pic>
+        <p:nvPicPr>
+          <p:cNvPr id="6" name="Picture 5"/>
+          <p:cNvPicPr>
+            <a:picLocks noChangeAspect="1"/>
+          </p:cNvPicPr>
+          <p:nvPr/>
+        </p:nvPicPr>
+        <p:blipFill>
+          <a:blip r:embed="rId3">
+            <a:extLst>
+              <a:ext uri="{28A0092B-C50C-407E-A947-70E740481C1C}">
+                <a14:useLocalDpi xmlns:a14="http://schemas.microsoft.com/office/drawing/2010/main" val="0"/>
+              </a:ext>
+            </a:extLst>
+          </a:blip>
+          <a:stretch>
+            <a:fillRect/>
+          </a:stretch>
+        </p:blipFill>
+        <p:spPr>
+          <a:xfrm>
+            <a:off x="720723" y="3524252"/>
+            <a:ext cx="3333748" cy="3333748"/>
+          </a:xfrm>
+          <a:prstGeom prst="rect">
+            <a:avLst/>
+          </a:prstGeom>
+        </p:spPr>
+      </p:pic>
+      <p:pic>
+        <p:nvPicPr>
+          <p:cNvPr id="7" name="Picture 6"/>
+          <p:cNvPicPr>
+            <a:picLocks noChangeAspect="1"/>
+          </p:cNvPicPr>
+          <p:nvPr/>
+        </p:nvPicPr>
+        <p:blipFill>
+          <a:blip r:embed="rId4">
+            <a:extLst>
+              <a:ext uri="{28A0092B-C50C-407E-A947-70E740481C1C}">
+                <a14:useLocalDpi xmlns:a14="http://schemas.microsoft.com/office/drawing/2010/main" val="0"/>
+              </a:ext>
+            </a:extLst>
+          </a:blip>
+          <a:stretch>
+            <a:fillRect/>
+          </a:stretch>
+        </p:blipFill>
+        <p:spPr>
+          <a:xfrm>
+            <a:off x="4054471" y="3947130"/>
+            <a:ext cx="4467229" cy="2910870"/>
+          </a:xfrm>
+          <a:prstGeom prst="rect">
+            <a:avLst/>
+          </a:prstGeom>
+        </p:spPr>
+      </p:pic>
+      <p:pic>
+        <p:nvPicPr>
+          <p:cNvPr id="8" name="Picture 7"/>
+          <p:cNvPicPr>
+            <a:picLocks noChangeAspect="1"/>
+          </p:cNvPicPr>
+          <p:nvPr/>
+        </p:nvPicPr>
+        <p:blipFill>
+          <a:blip r:embed="rId5">
+            <a:extLst>
+              <a:ext uri="{28A0092B-C50C-407E-A947-70E740481C1C}">
+                <a14:useLocalDpi xmlns:a14="http://schemas.microsoft.com/office/drawing/2010/main" val="0"/>
+              </a:ext>
+            </a:extLst>
+          </a:blip>
+          <a:stretch>
+            <a:fillRect/>
+          </a:stretch>
+        </p:blipFill>
+        <p:spPr>
+          <a:xfrm>
+            <a:off x="720723" y="1636963"/>
+            <a:ext cx="4152900" cy="2310167"/>
+          </a:xfrm>
+          <a:prstGeom prst="rect">
+            <a:avLst/>
+          </a:prstGeom>
+        </p:spPr>
+      </p:pic>
+    </p:spTree>
+    <p:extLst>
+      <p:ext uri="{BB962C8B-B14F-4D97-AF65-F5344CB8AC3E}">
+        <p14:creationId xmlns:p14="http://schemas.microsoft.com/office/powerpoint/2010/main" val="678419112"/>
+      </p:ext>
+    </p:extLst>
+  </p:cSld>
+  <p:clrMapOvr>
+    <a:masterClrMapping/>
+  </p:clrMapOvr>
+</p:sld>
+</file>
+
+<file path=ppt/slides/slide13.xml><?xml version="1.0" encoding="utf-8"?>
 <p:sld xmlns:a="http://schemas.openxmlformats.org/drawingml/2006/main" xmlns:r="http://schemas.openxmlformats.org/officeDocument/2006/relationships" xmlns:p="http://schemas.openxmlformats.org/presentationml/2006/main">
   <p:cSld>
     <p:spTree>
@@ -13914,6 +14416,49 @@
           </a:bodyPr>
           <a:lstStyle/>
           <a:p>
+            <a:pPr lvl="0"/>
+            <a:r>
+              <a:rPr lang="en-GB" sz="2000" dirty="0"/>
+              <a:t>The frustration of being stuck in just one body that inhabits only one place at a time. </a:t>
+            </a:r>
+          </a:p>
+          <a:p>
+            <a:pPr lvl="0"/>
+            <a:endParaRPr lang="en-GB" sz="2000" dirty="0"/>
+          </a:p>
+          <a:p>
+            <a:pPr lvl="0"/>
+            <a:r>
+              <a:rPr lang="en-GB" sz="2000" dirty="0"/>
+              <a:t>Why?</a:t>
+            </a:r>
+          </a:p>
+          <a:p>
+            <a:pPr lvl="0"/>
+            <a:endParaRPr lang="en-GB" sz="2000" dirty="0"/>
+          </a:p>
+          <a:p>
+            <a:pPr lvl="0"/>
+            <a:r>
+              <a:rPr lang="en-GB" sz="2000" dirty="0"/>
+              <a:t>Many different paths and options.</a:t>
+            </a:r>
+          </a:p>
+          <a:p>
+            <a:pPr lvl="0"/>
+            <a:r>
+              <a:rPr lang="en-GB" sz="2000" dirty="0"/>
+              <a:t>Applies to the mechanics and gameplay.  </a:t>
+            </a:r>
+          </a:p>
+          <a:p>
+            <a:pPr lvl="0"/>
+            <a:endParaRPr lang="en-US" sz="2000" dirty="0"/>
+          </a:p>
+          <a:p>
+            <a:endParaRPr lang="en-GB" sz="2000" dirty="0"/>
+          </a:p>
+          <a:p>
             <a:endParaRPr lang="en-GB" sz="2200" dirty="0"/>
           </a:p>
         </p:txBody>
@@ -13948,6 +14493,36 @@
           </a:p>
         </p:txBody>
       </p:sp>
+      <p:pic>
+        <p:nvPicPr>
+          <p:cNvPr id="5" name="Picture 4"/>
+          <p:cNvPicPr>
+            <a:picLocks noChangeAspect="1"/>
+          </p:cNvPicPr>
+          <p:nvPr/>
+        </p:nvPicPr>
+        <p:blipFill>
+          <a:blip r:embed="rId2" cstate="print">
+            <a:extLst>
+              <a:ext uri="{28A0092B-C50C-407E-A947-70E740481C1C}">
+                <a14:useLocalDpi xmlns:a14="http://schemas.microsoft.com/office/drawing/2010/main" val="0"/>
+              </a:ext>
+            </a:extLst>
+          </a:blip>
+          <a:stretch>
+            <a:fillRect/>
+          </a:stretch>
+        </p:blipFill>
+        <p:spPr>
+          <a:xfrm>
+            <a:off x="6781800" y="2679700"/>
+            <a:ext cx="1950720" cy="3048000"/>
+          </a:xfrm>
+          <a:prstGeom prst="rect">
+            <a:avLst/>
+          </a:prstGeom>
+        </p:spPr>
+      </p:pic>
     </p:spTree>
   </p:cSld>
   <p:clrMapOvr>
@@ -14362,9 +14937,46 @@
         </p:spPr>
         <p:txBody>
           <a:bodyPr>
-            <a:normAutofit/>
+            <a:normAutofit lnSpcReduction="10000"/>
           </a:bodyPr>
           <a:lstStyle/>
+          <a:p>
+            <a:r>
+              <a:rPr lang="en-GB" sz="2200" dirty="0"/>
+              <a:t>Build narrative as you play.</a:t>
+            </a:r>
+          </a:p>
+          <a:p>
+            <a:endParaRPr lang="en-GB" sz="2200" dirty="0"/>
+          </a:p>
+          <a:p>
+            <a:r>
+              <a:rPr lang="en-GB" sz="2200" dirty="0"/>
+              <a:t>Collecting memories.</a:t>
+            </a:r>
+          </a:p>
+          <a:p>
+            <a:endParaRPr lang="en-GB" sz="2200" dirty="0"/>
+          </a:p>
+          <a:p>
+            <a:r>
+              <a:rPr lang="en-GB" sz="2200" dirty="0"/>
+              <a:t>Character feels emotions along with the player.</a:t>
+            </a:r>
+          </a:p>
+          <a:p>
+            <a:endParaRPr lang="en-GB" sz="2200" dirty="0"/>
+          </a:p>
+          <a:p>
+            <a:r>
+              <a:rPr lang="en-GB" sz="2200" dirty="0" err="1"/>
+              <a:t>Monachopsis</a:t>
+            </a:r>
+            <a:r>
+              <a:rPr lang="en-GB" sz="2200" dirty="0"/>
+              <a:t> in narrative</a:t>
+            </a:r>
+          </a:p>
           <a:p>
             <a:endParaRPr lang="en-GB" sz="2200" dirty="0"/>
           </a:p>
@@ -15378,36 +15990,49 @@
         </p:spPr>
         <p:txBody>
           <a:bodyPr>
-            <a:normAutofit/>
+            <a:normAutofit lnSpcReduction="10000"/>
           </a:bodyPr>
           <a:lstStyle/>
           <a:p>
-            <a:endParaRPr lang="en-GB" sz="2200" dirty="0" smtClean="0"/>
+            <a:endParaRPr lang="en-GB" sz="2200" dirty="0"/>
           </a:p>
           <a:p>
             <a:r>
-              <a:rPr lang="en-GB" sz="2200" dirty="0" smtClean="0"/>
-              <a:t>Collect memories</a:t>
+              <a:rPr lang="en-GB" sz="2200" dirty="0"/>
+              <a:t>Collect diary memories</a:t>
             </a:r>
           </a:p>
           <a:p>
             <a:endParaRPr lang="en-GB" sz="2200" dirty="0"/>
           </a:p>
           <a:p>
-            <a:endParaRPr lang="en-GB" sz="2200" dirty="0" smtClean="0"/>
-          </a:p>
-          <a:p>
             <a:r>
-              <a:rPr lang="en-GB" sz="2200" dirty="0" smtClean="0"/>
-              <a:t>Over time, piece together</a:t>
+              <a:rPr lang="en-GB" sz="2200" dirty="0"/>
+              <a:t>Health Hearts </a:t>
             </a:r>
-            <a:br>
-              <a:rPr lang="en-GB" sz="2200" dirty="0" smtClean="0"/>
-            </a:br>
+          </a:p>
+          <a:p>
+            <a:endParaRPr lang="en-GB" sz="2200" dirty="0"/>
+          </a:p>
+          <a:p>
             <a:r>
-              <a:rPr lang="en-GB" sz="2200" dirty="0" smtClean="0"/>
-              <a:t>narrative</a:t>
+              <a:rPr lang="en-GB" sz="2200" dirty="0"/>
+              <a:t>Keys </a:t>
             </a:r>
+          </a:p>
+          <a:p>
+            <a:endParaRPr lang="en-GB" sz="2200" dirty="0"/>
+          </a:p>
+          <a:p>
+            <a:r>
+              <a:rPr lang="en-GB" sz="2200" dirty="0"/>
+              <a:t>Over time, piece together narrative.</a:t>
+            </a:r>
+          </a:p>
+          <a:p>
+            <a:pPr marL="0" indent="0">
+              <a:buNone/>
+            </a:pPr>
             <a:endParaRPr lang="en-GB" sz="2200" dirty="0"/>
           </a:p>
         </p:txBody>
@@ -15442,6 +16067,78 @@
           </a:p>
         </p:txBody>
       </p:sp>
+      <p:pic>
+        <p:nvPicPr>
+          <p:cNvPr id="5" name="Picture 4"/>
+          <p:cNvPicPr>
+            <a:picLocks noChangeAspect="1"/>
+          </p:cNvPicPr>
+          <p:nvPr/>
+        </p:nvPicPr>
+        <p:blipFill>
+          <a:blip r:embed="rId2"/>
+          <a:stretch>
+            <a:fillRect/>
+          </a:stretch>
+        </p:blipFill>
+        <p:spPr>
+          <a:xfrm>
+            <a:off x="7467600" y="2438400"/>
+            <a:ext cx="1524849" cy="2028825"/>
+          </a:xfrm>
+          <a:prstGeom prst="rect">
+            <a:avLst/>
+          </a:prstGeom>
+        </p:spPr>
+      </p:pic>
+      <p:pic>
+        <p:nvPicPr>
+          <p:cNvPr id="6" name="Picture 5"/>
+          <p:cNvPicPr>
+            <a:picLocks noChangeAspect="1"/>
+          </p:cNvPicPr>
+          <p:nvPr/>
+        </p:nvPicPr>
+        <p:blipFill>
+          <a:blip r:embed="rId3"/>
+          <a:stretch>
+            <a:fillRect/>
+          </a:stretch>
+        </p:blipFill>
+        <p:spPr>
+          <a:xfrm>
+            <a:off x="4558145" y="2434243"/>
+            <a:ext cx="2909455" cy="2032981"/>
+          </a:xfrm>
+          <a:prstGeom prst="rect">
+            <a:avLst/>
+          </a:prstGeom>
+        </p:spPr>
+      </p:pic>
+      <p:pic>
+        <p:nvPicPr>
+          <p:cNvPr id="7" name="Picture 6"/>
+          <p:cNvPicPr>
+            <a:picLocks noChangeAspect="1"/>
+          </p:cNvPicPr>
+          <p:nvPr/>
+        </p:nvPicPr>
+        <p:blipFill>
+          <a:blip r:embed="rId4"/>
+          <a:stretch>
+            <a:fillRect/>
+          </a:stretch>
+        </p:blipFill>
+        <p:spPr>
+          <a:xfrm>
+            <a:off x="7438653" y="4510600"/>
+            <a:ext cx="1553796" cy="1553796"/>
+          </a:xfrm>
+          <a:prstGeom prst="rect">
+            <a:avLst/>
+          </a:prstGeom>
+        </p:spPr>
+      </p:pic>
     </p:spTree>
   </p:cSld>
   <p:clrMapOvr>

</xml_diff>